<commit_message>
add initial presentation 4 draft
</commit_message>
<xml_diff>
--- a/Presentations/Presentation04.pptx
+++ b/Presentations/Presentation04.pptx
@@ -11033,7 +11033,7 @@
           <a:p>
             <a:r>
               <a:rPr lang="en-US" dirty="0"/>
-              <a:t>Interesting Things: 1</a:t>
+              <a:t>Interesting Things: Nonparametric fails</a:t>
             </a:r>
           </a:p>
         </p:txBody>
@@ -11141,7 +11141,15 @@
           <a:p>
             <a:r>
               <a:rPr lang="en-US" dirty="0"/>
-              <a:t>Interesting Things: 2</a:t>
+              <a:t>Interesting Things: </a:t>
+            </a:r>
+            <a:r>
+              <a:rPr lang="en-US" dirty="0" err="1"/>
+              <a:t>xgboost</a:t>
+            </a:r>
+            <a:r>
+              <a:rPr lang="en-US" dirty="0"/>
+              <a:t> for the win</a:t>
             </a:r>
           </a:p>
         </p:txBody>
@@ -11249,7 +11257,7 @@
           <a:p>
             <a:r>
               <a:rPr lang="en-US" dirty="0"/>
-              <a:t>Interesting Things: 3</a:t>
+              <a:t>Interesting Things: No one size fits all</a:t>
             </a:r>
           </a:p>
         </p:txBody>
@@ -11357,7 +11365,7 @@
           <a:p>
             <a:r>
               <a:rPr lang="en-US" dirty="0"/>
-              <a:t>Biggest Challenge </a:t>
+              <a:t>Biggest Challenge: API and fees </a:t>
             </a:r>
           </a:p>
         </p:txBody>
@@ -11491,7 +11499,10 @@
           <a:bodyPr/>
           <a:lstStyle/>
           <a:p>
-            <a:endParaRPr lang="en-US"/>
+            <a:r>
+              <a:rPr lang="en-US" dirty="0"/>
+              <a:t>Precipitation data</a:t>
+            </a:r>
           </a:p>
         </p:txBody>
       </p:sp>
@@ -11599,7 +11610,10 @@
           <a:bodyPr/>
           <a:lstStyle/>
           <a:p>
-            <a:endParaRPr lang="en-US"/>
+            <a:r>
+              <a:rPr lang="en-US" dirty="0"/>
+              <a:t>Jason and Aubrey’s interesting things</a:t>
+            </a:r>
           </a:p>
         </p:txBody>
       </p:sp>

</xml_diff>